<commit_message>
Changes to the ppt from today's practice
</commit_message>
<xml_diff>
--- a/Documents/ClientPresent3FOREAL.pptx
+++ b/Documents/ClientPresent3FOREAL.pptx
@@ -5,7 +5,7 @@
     <p:sldMasterId id="2147483660" r:id="rId1"/>
   </p:sldMasterIdLst>
   <p:notesMasterIdLst>
-    <p:notesMasterId r:id="rId27"/>
+    <p:notesMasterId r:id="rId29"/>
   </p:notesMasterIdLst>
   <p:sldIdLst>
     <p:sldId id="256" r:id="rId2"/>
@@ -31,8 +31,10 @@
     <p:sldId id="277" r:id="rId22"/>
     <p:sldId id="278" r:id="rId23"/>
     <p:sldId id="279" r:id="rId24"/>
-    <p:sldId id="280" r:id="rId25"/>
-    <p:sldId id="281" r:id="rId26"/>
+    <p:sldId id="282" r:id="rId25"/>
+    <p:sldId id="283" r:id="rId26"/>
+    <p:sldId id="280" r:id="rId27"/>
+    <p:sldId id="281" r:id="rId28"/>
   </p:sldIdLst>
   <p:sldSz cx="12192000" cy="6858000"/>
   <p:notesSz cx="6858000" cy="9144000"/>
@@ -1602,9 +1604,8 @@
           <a:p>
             <a:r>
               <a:rPr lang="en-US" dirty="0" smtClean="0"/>
-              <a:t>Andrew</a:t>
-            </a:r>
-            <a:endParaRPr lang="en-US" dirty="0"/>
+              <a:t>Christine</a:t>
+            </a:r>
           </a:p>
         </p:txBody>
       </p:sp>
@@ -6298,8 +6299,8 @@
           </a:p>
         </p:txBody>
       </p:sp>
-      <mc:AlternateContent xmlns:mc="http://schemas.openxmlformats.org/markup-compatibility/2006">
-        <mc:Choice xmlns:a14="http://schemas.microsoft.com/office/drawing/2010/main" Requires="a14">
+      <mc:AlternateContent xmlns:mc="http://schemas.openxmlformats.org/markup-compatibility/2006" xmlns:a14="http://schemas.microsoft.com/office/drawing/2010/main">
+        <mc:Choice Requires="a14">
           <p:sp>
             <p:nvSpPr>
               <p:cNvPr id="3" name="Content Placeholder 2"/>
@@ -6486,7 +6487,7 @@
             </p:txBody>
           </p:sp>
         </mc:Choice>
-        <mc:Fallback>
+        <mc:Fallback xmlns="">
           <p:sp>
             <p:nvSpPr>
               <p:cNvPr id="3" name="Content Placeholder 2"/>
@@ -6524,8 +6525,8 @@
           </p:sp>
         </mc:Fallback>
       </mc:AlternateContent>
-      <mc:AlternateContent xmlns:mc="http://schemas.openxmlformats.org/markup-compatibility/2006">
-        <mc:Choice xmlns:a14="http://schemas.microsoft.com/office/drawing/2010/main" Requires="a14">
+      <mc:AlternateContent xmlns:mc="http://schemas.openxmlformats.org/markup-compatibility/2006" xmlns:a14="http://schemas.microsoft.com/office/drawing/2010/main">
+        <mc:Choice Requires="a14">
           <p:sp>
             <p:nvSpPr>
               <p:cNvPr id="4" name="Content Placeholder 3"/>
@@ -6711,7 +6712,7 @@
             </p:txBody>
           </p:sp>
         </mc:Choice>
-        <mc:Fallback>
+        <mc:Fallback xmlns="">
           <p:sp>
             <p:nvSpPr>
               <p:cNvPr id="4" name="Content Placeholder 3"/>
@@ -7891,10 +7892,10 @@
           <a:lstStyle/>
           <a:p>
             <a:r>
-              <a:rPr lang="en-US" dirty="0" smtClean="0"/>
+              <a:rPr lang="en-US" sz="6600" b="1" dirty="0" smtClean="0"/>
               <a:t>Prototype</a:t>
             </a:r>
-            <a:endParaRPr lang="en-US" dirty="0"/>
+            <a:endParaRPr lang="en-US" b="1" dirty="0"/>
           </a:p>
         </p:txBody>
       </p:sp>
@@ -7999,6 +8000,237 @@
             <a:spLocks noGrp="1"/>
           </p:cNvSpPr>
           <p:nvPr>
+            <p:ph type="title"/>
+          </p:nvPr>
+        </p:nvSpPr>
+        <p:spPr/>
+        <p:txBody>
+          <a:bodyPr/>
+          <a:lstStyle/>
+          <a:p>
+            <a:endParaRPr lang="en-US"/>
+          </a:p>
+        </p:txBody>
+      </p:sp>
+      <p:pic>
+        <p:nvPicPr>
+          <p:cNvPr id="4" name="Shape 121"/>
+          <p:cNvPicPr preferRelativeResize="0">
+            <a:picLocks noGrp="1"/>
+          </p:cNvPicPr>
+          <p:nvPr>
+            <p:ph idx="1"/>
+          </p:nvPr>
+        </p:nvPicPr>
+        <p:blipFill rotWithShape="1">
+          <a:blip r:embed="rId2">
+            <a:alphaModFix/>
+          </a:blip>
+          <a:srcRect l="-1720" t="-1360" r="-2411" b="-2142"/>
+          <a:stretch/>
+        </p:blipFill>
+        <p:spPr>
+          <a:xfrm>
+            <a:off x="3353678" y="703385"/>
+            <a:ext cx="4547676" cy="5579086"/>
+          </a:xfrm>
+          <a:prstGeom prst="rect">
+            <a:avLst/>
+          </a:prstGeom>
+          <a:solidFill>
+            <a:srgbClr val="FFFFFF">
+              <a:shade val="85000"/>
+            </a:srgbClr>
+          </a:solidFill>
+          <a:ln w="88900" cap="sq">
+            <a:solidFill>
+              <a:srgbClr val="FFFFFF"/>
+            </a:solidFill>
+            <a:miter lim="800000"/>
+          </a:ln>
+          <a:effectLst>
+            <a:outerShdw blurRad="55000" dist="18000" dir="5400000" algn="tl" rotWithShape="0">
+              <a:srgbClr val="000000">
+                <a:alpha val="40000"/>
+              </a:srgbClr>
+            </a:outerShdw>
+          </a:effectLst>
+          <a:scene3d>
+            <a:camera prst="orthographicFront"/>
+            <a:lightRig rig="twoPt" dir="t">
+              <a:rot lat="0" lon="0" rev="7200000"/>
+            </a:lightRig>
+          </a:scene3d>
+          <a:sp3d>
+            <a:bevelT w="25400" h="19050"/>
+            <a:contourClr>
+              <a:srgbClr val="FFFFFF"/>
+            </a:contourClr>
+          </a:sp3d>
+        </p:spPr>
+      </p:pic>
+    </p:spTree>
+    <p:extLst>
+      <p:ext uri="{BB962C8B-B14F-4D97-AF65-F5344CB8AC3E}">
+        <p14:creationId xmlns:p14="http://schemas.microsoft.com/office/powerpoint/2010/main" val="2625261577"/>
+      </p:ext>
+    </p:extLst>
+  </p:cSld>
+  <p:clrMapOvr>
+    <a:masterClrMapping/>
+  </p:clrMapOvr>
+  <p:timing>
+    <p:tnLst>
+      <p:par>
+        <p:cTn id="1" dur="indefinite" restart="never" nodeType="tmRoot"/>
+      </p:par>
+    </p:tnLst>
+  </p:timing>
+</p:sld>
+</file>
+
+<file path=ppt/slides/slide25.xml><?xml version="1.0" encoding="utf-8"?>
+<p:sld xmlns:a="http://schemas.openxmlformats.org/drawingml/2006/main" xmlns:r="http://schemas.openxmlformats.org/officeDocument/2006/relationships" xmlns:p="http://schemas.openxmlformats.org/presentationml/2006/main">
+  <p:cSld>
+    <p:spTree>
+      <p:nvGrpSpPr>
+        <p:cNvPr id="1" name=""/>
+        <p:cNvGrpSpPr/>
+        <p:nvPr/>
+      </p:nvGrpSpPr>
+      <p:grpSpPr>
+        <a:xfrm>
+          <a:off x="0" y="0"/>
+          <a:ext cx="0" cy="0"/>
+          <a:chOff x="0" y="0"/>
+          <a:chExt cx="0" cy="0"/>
+        </a:xfrm>
+      </p:grpSpPr>
+      <p:sp>
+        <p:nvSpPr>
+          <p:cNvPr id="2" name="Title 1"/>
+          <p:cNvSpPr>
+            <a:spLocks noGrp="1"/>
+          </p:cNvSpPr>
+          <p:nvPr>
+            <p:ph type="title"/>
+          </p:nvPr>
+        </p:nvSpPr>
+        <p:spPr/>
+        <p:txBody>
+          <a:bodyPr/>
+          <a:lstStyle/>
+          <a:p>
+            <a:endParaRPr lang="en-US"/>
+          </a:p>
+        </p:txBody>
+      </p:sp>
+      <p:pic>
+        <p:nvPicPr>
+          <p:cNvPr id="4" name="Content Placeholder 3"/>
+          <p:cNvPicPr>
+            <a:picLocks noGrp="1" noChangeAspect="1"/>
+          </p:cNvPicPr>
+          <p:nvPr>
+            <p:ph idx="1"/>
+          </p:nvPr>
+        </p:nvPicPr>
+        <p:blipFill>
+          <a:blip r:embed="rId2">
+            <a:extLst>
+              <a:ext uri="{28A0092B-C50C-407E-A947-70E740481C1C}">
+                <a14:useLocalDpi xmlns:a14="http://schemas.microsoft.com/office/drawing/2010/main" val="0"/>
+              </a:ext>
+            </a:extLst>
+          </a:blip>
+          <a:stretch>
+            <a:fillRect/>
+          </a:stretch>
+        </p:blipFill>
+        <p:spPr>
+          <a:xfrm>
+            <a:off x="2577266" y="761935"/>
+            <a:ext cx="7037467" cy="5334130"/>
+          </a:xfrm>
+          <a:prstGeom prst="rect">
+            <a:avLst/>
+          </a:prstGeom>
+          <a:solidFill>
+            <a:srgbClr val="FFFFFF">
+              <a:shade val="85000"/>
+            </a:srgbClr>
+          </a:solidFill>
+          <a:ln w="88900" cap="sq">
+            <a:solidFill>
+              <a:srgbClr val="FFFFFF"/>
+            </a:solidFill>
+            <a:miter lim="800000"/>
+          </a:ln>
+          <a:effectLst>
+            <a:outerShdw blurRad="55000" dist="18000" dir="5400000" algn="tl" rotWithShape="0">
+              <a:srgbClr val="000000">
+                <a:alpha val="40000"/>
+              </a:srgbClr>
+            </a:outerShdw>
+          </a:effectLst>
+          <a:scene3d>
+            <a:camera prst="orthographicFront"/>
+            <a:lightRig rig="twoPt" dir="t">
+              <a:rot lat="0" lon="0" rev="7200000"/>
+            </a:lightRig>
+          </a:scene3d>
+          <a:sp3d>
+            <a:bevelT w="25400" h="19050"/>
+            <a:contourClr>
+              <a:srgbClr val="FFFFFF"/>
+            </a:contourClr>
+          </a:sp3d>
+        </p:spPr>
+      </p:pic>
+    </p:spTree>
+    <p:extLst>
+      <p:ext uri="{BB962C8B-B14F-4D97-AF65-F5344CB8AC3E}">
+        <p14:creationId xmlns:p14="http://schemas.microsoft.com/office/powerpoint/2010/main" val="2534318499"/>
+      </p:ext>
+    </p:extLst>
+  </p:cSld>
+  <p:clrMapOvr>
+    <a:masterClrMapping/>
+  </p:clrMapOvr>
+  <p:timing>
+    <p:tnLst>
+      <p:par>
+        <p:cTn id="1" dur="indefinite" restart="never" nodeType="tmRoot"/>
+      </p:par>
+    </p:tnLst>
+  </p:timing>
+</p:sld>
+</file>
+
+<file path=ppt/slides/slide26.xml><?xml version="1.0" encoding="utf-8"?>
+<p:sld xmlns:a="http://schemas.openxmlformats.org/drawingml/2006/main" xmlns:r="http://schemas.openxmlformats.org/officeDocument/2006/relationships" xmlns:p="http://schemas.openxmlformats.org/presentationml/2006/main">
+  <p:cSld>
+    <p:spTree>
+      <p:nvGrpSpPr>
+        <p:cNvPr id="1" name=""/>
+        <p:cNvGrpSpPr/>
+        <p:nvPr/>
+      </p:nvGrpSpPr>
+      <p:grpSpPr>
+        <a:xfrm>
+          <a:off x="0" y="0"/>
+          <a:ext cx="0" cy="0"/>
+          <a:chOff x="0" y="0"/>
+          <a:chExt cx="0" cy="0"/>
+        </a:xfrm>
+      </p:grpSpPr>
+      <p:sp>
+        <p:nvSpPr>
+          <p:cNvPr id="2" name="Title 1"/>
+          <p:cNvSpPr>
+            <a:spLocks noGrp="1"/>
+          </p:cNvSpPr>
+          <p:nvPr>
             <p:ph type="ctrTitle"/>
           </p:nvPr>
         </p:nvSpPr>
@@ -8056,7 +8288,7 @@
 </p:sld>
 </file>
 
-<file path=ppt/slides/slide25.xml><?xml version="1.0" encoding="utf-8"?>
+<file path=ppt/slides/slide27.xml><?xml version="1.0" encoding="utf-8"?>
 <p:sld xmlns:a="http://schemas.openxmlformats.org/drawingml/2006/main" xmlns:r="http://schemas.openxmlformats.org/officeDocument/2006/relationships" xmlns:p="http://schemas.openxmlformats.org/presentationml/2006/main">
   <p:cSld>
     <p:spTree>
@@ -8466,37 +8698,49 @@
           </a:p>
           <a:p>
             <a:r>
-              <a:rPr lang="en-US" sz="2500" dirty="0" smtClean="0"/>
-              <a:t>Routing Tables</a:t>
-            </a:r>
-          </a:p>
-          <a:p>
-            <a:endParaRPr lang="en-US" sz="2500" dirty="0" smtClean="0"/>
-          </a:p>
-          <a:p>
-            <a:r>
-              <a:rPr lang="en-US" sz="2500" dirty="0" smtClean="0"/>
-              <a:t>USB to Ethernet Cords</a:t>
-            </a:r>
-          </a:p>
-          <a:p>
-            <a:endParaRPr lang="en-US" sz="2500" dirty="0" smtClean="0"/>
-          </a:p>
-          <a:p>
-            <a:r>
-              <a:rPr lang="en-US" sz="2500" dirty="0" smtClean="0"/>
+              <a:rPr lang="en-US" sz="2500" dirty="0"/>
               <a:t>Python </a:t>
             </a:r>
           </a:p>
           <a:p>
-            <a:endParaRPr lang="en-US" sz="2500" dirty="0" smtClean="0"/>
+            <a:endParaRPr lang="en-US" sz="2500" dirty="0"/>
           </a:p>
           <a:p>
             <a:r>
               <a:rPr lang="en-US" sz="2500" dirty="0" err="1" smtClean="0"/>
               <a:t>Pyplot</a:t>
             </a:r>
+            <a:endParaRPr lang="en-US" sz="2500" dirty="0" smtClean="0"/>
+          </a:p>
+          <a:p>
             <a:endParaRPr lang="en-US" sz="2500" dirty="0"/>
+          </a:p>
+          <a:p>
+            <a:r>
+              <a:rPr lang="en-US" sz="2500" dirty="0" smtClean="0"/>
+              <a:t>Routing </a:t>
+            </a:r>
+            <a:r>
+              <a:rPr lang="en-US" sz="2500" dirty="0" smtClean="0"/>
+              <a:t>Tables</a:t>
+            </a:r>
+          </a:p>
+          <a:p>
+            <a:endParaRPr lang="en-US" sz="2500" dirty="0" smtClean="0"/>
+          </a:p>
+          <a:p>
+            <a:r>
+              <a:rPr lang="en-US" sz="2500" dirty="0" smtClean="0"/>
+              <a:t>USB to </a:t>
+            </a:r>
+            <a:r>
+              <a:rPr lang="en-US" sz="2500" dirty="0" smtClean="0"/>
+              <a:t>Ethernet</a:t>
+            </a:r>
+            <a:endParaRPr lang="en-US" sz="2500" dirty="0" smtClean="0"/>
+          </a:p>
+          <a:p>
+            <a:endParaRPr lang="en-US" sz="2500" dirty="0" smtClean="0"/>
           </a:p>
         </p:txBody>
       </p:sp>
@@ -8586,7 +8830,15 @@
           <a:p>
             <a:r>
               <a:rPr lang="en-US" sz="3200" dirty="0" smtClean="0"/>
-              <a:t>Benchmark PINPACK on multiple number of devices</a:t>
+              <a:t>Benchmark </a:t>
+            </a:r>
+            <a:r>
+              <a:rPr lang="en-US" sz="3200" dirty="0" smtClean="0"/>
+              <a:t>LINPACK </a:t>
+            </a:r>
+            <a:r>
+              <a:rPr lang="en-US" sz="3200" dirty="0" smtClean="0"/>
+              <a:t>on multiple number of devices</a:t>
             </a:r>
           </a:p>
           <a:p>
@@ -8621,7 +8873,11 @@
           <a:p>
             <a:r>
               <a:rPr lang="en-US" sz="3200" dirty="0" smtClean="0"/>
-              <a:t>USP and GPIO</a:t>
+              <a:t>USB </a:t>
+            </a:r>
+            <a:r>
+              <a:rPr lang="en-US" sz="3200" dirty="0" smtClean="0"/>
+              <a:t>and GPIO</a:t>
             </a:r>
           </a:p>
           <a:p>
@@ -8655,71 +8911,85 @@
         </p:nvSpPr>
         <p:spPr>
           <a:xfrm>
-            <a:off x="6172200" y="1825625"/>
+            <a:off x="6172200" y="1710959"/>
             <a:ext cx="5181600" cy="4868252"/>
           </a:xfrm>
         </p:spPr>
         <p:txBody>
           <a:bodyPr>
-            <a:normAutofit lnSpcReduction="10000"/>
+            <a:noAutofit/>
           </a:bodyPr>
           <a:lstStyle/>
           <a:p>
             <a:r>
-              <a:rPr lang="en-US" dirty="0" smtClean="0"/>
-              <a:t>MICS Conference</a:t>
+              <a:rPr lang="en-US" sz="3200" dirty="0"/>
+              <a:t>Topology Design</a:t>
             </a:r>
           </a:p>
           <a:p>
             <a:pPr lvl="1"/>
             <a:r>
-              <a:rPr lang="en-US" dirty="0" smtClean="0"/>
+              <a:rPr lang="en-US" sz="2800" dirty="0"/>
+              <a:t>Ring and </a:t>
+            </a:r>
+            <a:r>
+              <a:rPr lang="en-US" sz="2800" dirty="0" smtClean="0"/>
+              <a:t>hypercube</a:t>
+            </a:r>
+          </a:p>
+          <a:p>
+            <a:pPr lvl="1"/>
+            <a:endParaRPr lang="en-US" sz="2800" dirty="0"/>
+          </a:p>
+          <a:p>
+            <a:r>
+              <a:rPr lang="en-US" sz="3200" dirty="0"/>
+              <a:t>Routing </a:t>
+            </a:r>
+            <a:r>
+              <a:rPr lang="en-US" sz="3200" dirty="0" smtClean="0"/>
+              <a:t>tables</a:t>
+            </a:r>
+          </a:p>
+          <a:p>
+            <a:endParaRPr lang="en-US" dirty="0"/>
+          </a:p>
+          <a:p>
+            <a:r>
+              <a:rPr lang="en-US" sz="3200" dirty="0" smtClean="0"/>
+              <a:t>MICS </a:t>
+            </a:r>
+            <a:r>
+              <a:rPr lang="en-US" sz="3200" dirty="0" smtClean="0"/>
+              <a:t>Conference</a:t>
+            </a:r>
+          </a:p>
+          <a:p>
+            <a:pPr lvl="1"/>
+            <a:r>
+              <a:rPr lang="en-US" sz="2800" dirty="0" smtClean="0"/>
               <a:t>Paper and abstract</a:t>
             </a:r>
           </a:p>
           <a:p>
+            <a:pPr marL="0" indent="0">
+              <a:buNone/>
+            </a:pPr>
+            <a:endParaRPr lang="en-US" dirty="0" smtClean="0"/>
+          </a:p>
+          <a:p>
+            <a:r>
+              <a:rPr lang="en-US" sz="3200" dirty="0" smtClean="0"/>
+              <a:t>SDSMT Research Symposium</a:t>
+            </a:r>
+          </a:p>
+          <a:p>
             <a:pPr lvl="1"/>
-            <a:endParaRPr lang="en-US" dirty="0" smtClean="0"/>
-          </a:p>
-          <a:p>
-            <a:r>
-              <a:rPr lang="en-US" dirty="0" smtClean="0"/>
-              <a:t>Topology Design</a:t>
-            </a:r>
-          </a:p>
-          <a:p>
-            <a:pPr lvl="1"/>
-            <a:r>
-              <a:rPr lang="en-US" dirty="0" smtClean="0"/>
-              <a:t>Ring and hypercube</a:t>
-            </a:r>
-          </a:p>
-          <a:p>
-            <a:pPr lvl="1"/>
-            <a:endParaRPr lang="en-US" dirty="0" smtClean="0"/>
-          </a:p>
-          <a:p>
-            <a:r>
-              <a:rPr lang="en-US" dirty="0" smtClean="0"/>
-              <a:t>Routing tables</a:t>
-            </a:r>
-          </a:p>
-          <a:p>
-            <a:endParaRPr lang="en-US" dirty="0" smtClean="0"/>
-          </a:p>
-          <a:p>
-            <a:r>
-              <a:rPr lang="en-US" dirty="0" smtClean="0"/>
-              <a:t>SDSMT Research Symposium</a:t>
-            </a:r>
-          </a:p>
-          <a:p>
-            <a:pPr lvl="1"/>
-            <a:r>
-              <a:rPr lang="en-US" dirty="0" smtClean="0"/>
+            <a:r>
+              <a:rPr lang="en-US" sz="2800" dirty="0" smtClean="0"/>
               <a:t>Abstract</a:t>
             </a:r>
-            <a:endParaRPr lang="en-US" dirty="0"/>
+            <a:endParaRPr lang="en-US" sz="2800" dirty="0"/>
           </a:p>
         </p:txBody>
       </p:sp>

</xml_diff>